<commit_message>
add R3 with improving the slides relating to the information theory views on access channel design, aka power control + successive interference cancellation
</commit_message>
<xml_diff>
--- a/Can Dumb Beat Smart R2.pptx
+++ b/Can Dumb Beat Smart R2.pptx
@@ -355,7 +355,7 @@
             <a:fld id="{B61BEF0D-F0BB-DE4B-95CE-6DB70DBA9567}" type="datetimeFigureOut">
               <a:rPr lang="en-US" dirty="0"/>
               <a:pPr/>
-              <a:t>8/18/19</a:t>
+              <a:t>1/17/21</a:t>
             </a:fld>
             <a:endParaRPr lang="en-US" dirty="0"/>
           </a:p>
@@ -686,7 +686,7 @@
             <a:fld id="{B61BEF0D-F0BB-DE4B-95CE-6DB70DBA9567}" type="datetimeFigureOut">
               <a:rPr lang="en-US" dirty="0"/>
               <a:pPr/>
-              <a:t>8/18/19</a:t>
+              <a:t>1/17/21</a:t>
             </a:fld>
             <a:endParaRPr lang="en-US" dirty="0"/>
           </a:p>
@@ -961,7 +961,7 @@
             <a:fld id="{B61BEF0D-F0BB-DE4B-95CE-6DB70DBA9567}" type="datetimeFigureOut">
               <a:rPr lang="en-US" dirty="0"/>
               <a:pPr/>
-              <a:t>8/18/19</a:t>
+              <a:t>1/17/21</a:t>
             </a:fld>
             <a:endParaRPr lang="en-US" dirty="0"/>
           </a:p>
@@ -1526,7 +1526,7 @@
             <a:fld id="{B61BEF0D-F0BB-DE4B-95CE-6DB70DBA9567}" type="datetimeFigureOut">
               <a:rPr lang="en-US" dirty="0"/>
               <a:pPr/>
-              <a:t>8/18/19</a:t>
+              <a:t>1/17/21</a:t>
             </a:fld>
             <a:endParaRPr lang="en-US" dirty="0"/>
           </a:p>
@@ -1801,7 +1801,7 @@
             <a:fld id="{B61BEF0D-F0BB-DE4B-95CE-6DB70DBA9567}" type="datetimeFigureOut">
               <a:rPr lang="en-US" dirty="0"/>
               <a:pPr/>
-              <a:t>8/18/19</a:t>
+              <a:t>1/17/21</a:t>
             </a:fld>
             <a:endParaRPr lang="en-US" dirty="0"/>
           </a:p>
@@ -2360,7 +2360,7 @@
             <a:fld id="{B61BEF0D-F0BB-DE4B-95CE-6DB70DBA9567}" type="datetimeFigureOut">
               <a:rPr lang="en-US" dirty="0"/>
               <a:pPr/>
-              <a:t>8/18/19</a:t>
+              <a:t>1/17/21</a:t>
             </a:fld>
             <a:endParaRPr lang="en-US" dirty="0"/>
           </a:p>
@@ -2684,7 +2684,7 @@
             <a:fld id="{B61BEF0D-F0BB-DE4B-95CE-6DB70DBA9567}" type="datetimeFigureOut">
               <a:rPr lang="en-US" dirty="0"/>
               <a:pPr/>
-              <a:t>8/18/19</a:t>
+              <a:t>1/17/21</a:t>
             </a:fld>
             <a:endParaRPr lang="en-US" dirty="0"/>
           </a:p>
@@ -2858,7 +2858,7 @@
             <a:fld id="{B61BEF0D-F0BB-DE4B-95CE-6DB70DBA9567}" type="datetimeFigureOut">
               <a:rPr lang="en-US" dirty="0"/>
               <a:pPr/>
-              <a:t>8/18/19</a:t>
+              <a:t>1/17/21</a:t>
             </a:fld>
             <a:endParaRPr lang="en-US" dirty="0"/>
           </a:p>
@@ -3093,7 +3093,7 @@
             <a:fld id="{B61BEF0D-F0BB-DE4B-95CE-6DB70DBA9567}" type="datetimeFigureOut">
               <a:rPr lang="en-US" dirty="0"/>
               <a:pPr/>
-              <a:t>8/18/19</a:t>
+              <a:t>1/17/21</a:t>
             </a:fld>
             <a:endParaRPr lang="en-US" dirty="0"/>
           </a:p>
@@ -3290,7 +3290,7 @@
             <a:fld id="{B61BEF0D-F0BB-DE4B-95CE-6DB70DBA9567}" type="datetimeFigureOut">
               <a:rPr lang="en-US" dirty="0"/>
               <a:pPr/>
-              <a:t>8/18/19</a:t>
+              <a:t>1/17/21</a:t>
             </a:fld>
             <a:endParaRPr lang="en-US" dirty="0"/>
           </a:p>
@@ -3563,7 +3563,7 @@
             <a:fld id="{B61BEF0D-F0BB-DE4B-95CE-6DB70DBA9567}" type="datetimeFigureOut">
               <a:rPr lang="en-US" dirty="0"/>
               <a:pPr/>
-              <a:t>8/18/19</a:t>
+              <a:t>1/17/21</a:t>
             </a:fld>
             <a:endParaRPr lang="en-US" dirty="0"/>
           </a:p>
@@ -3826,7 +3826,7 @@
             <a:fld id="{B61BEF0D-F0BB-DE4B-95CE-6DB70DBA9567}" type="datetimeFigureOut">
               <a:rPr lang="en-US" dirty="0"/>
               <a:pPr/>
-              <a:t>8/18/19</a:t>
+              <a:t>1/17/21</a:t>
             </a:fld>
             <a:endParaRPr lang="en-US" dirty="0"/>
           </a:p>
@@ -4197,7 +4197,7 @@
             <a:fld id="{B61BEF0D-F0BB-DE4B-95CE-6DB70DBA9567}" type="datetimeFigureOut">
               <a:rPr lang="en-US" dirty="0"/>
               <a:pPr/>
-              <a:t>8/18/19</a:t>
+              <a:t>1/17/21</a:t>
             </a:fld>
             <a:endParaRPr lang="en-US" dirty="0"/>
           </a:p>
@@ -4342,7 +4342,7 @@
             <a:fld id="{B61BEF0D-F0BB-DE4B-95CE-6DB70DBA9567}" type="datetimeFigureOut">
               <a:rPr lang="en-US" dirty="0"/>
               <a:pPr/>
-              <a:t>8/18/19</a:t>
+              <a:t>1/17/21</a:t>
             </a:fld>
             <a:endParaRPr lang="en-US" dirty="0"/>
           </a:p>
@@ -4464,7 +4464,7 @@
             <a:fld id="{B61BEF0D-F0BB-DE4B-95CE-6DB70DBA9567}" type="datetimeFigureOut">
               <a:rPr lang="en-US" dirty="0"/>
               <a:pPr/>
-              <a:t>8/18/19</a:t>
+              <a:t>1/17/21</a:t>
             </a:fld>
             <a:endParaRPr lang="en-US" dirty="0"/>
           </a:p>
@@ -4746,7 +4746,7 @@
             <a:fld id="{B61BEF0D-F0BB-DE4B-95CE-6DB70DBA9567}" type="datetimeFigureOut">
               <a:rPr lang="en-US" dirty="0"/>
               <a:pPr/>
-              <a:t>8/18/19</a:t>
+              <a:t>1/17/21</a:t>
             </a:fld>
             <a:endParaRPr lang="en-US" dirty="0"/>
           </a:p>
@@ -5067,7 +5067,7 @@
             <a:fld id="{B61BEF0D-F0BB-DE4B-95CE-6DB70DBA9567}" type="datetimeFigureOut">
               <a:rPr lang="en-US" dirty="0"/>
               <a:pPr/>
-              <a:t>8/18/19</a:t>
+              <a:t>1/17/21</a:t>
             </a:fld>
             <a:endParaRPr lang="en-US" dirty="0"/>
           </a:p>
@@ -5278,7 +5278,7 @@
             <a:fld id="{B61BEF0D-F0BB-DE4B-95CE-6DB70DBA9567}" type="datetimeFigureOut">
               <a:rPr lang="en-US" dirty="0"/>
               <a:pPr/>
-              <a:t>8/18/19</a:t>
+              <a:t>1/17/21</a:t>
             </a:fld>
             <a:endParaRPr lang="en-US" dirty="0"/>
           </a:p>
@@ -5959,7 +5959,7 @@
           <a:graphicData uri="http://schemas.openxmlformats.org/presentationml/2006/ole">
             <mc:AlternateContent xmlns:mc="http://schemas.openxmlformats.org/markup-compatibility/2006">
               <mc:Choice xmlns:v="urn:schemas-microsoft-com:vml" Requires="v">
-                <p:oleObj spid="_x0000_s2146" name="Visio" r:id="rId3" imgW="17856200" imgH="13309600" progId="Visio.Drawing.11">
+                <p:oleObj spid="_x0000_s2148" name="Visio" r:id="rId3" imgW="17856200" imgH="13309600" progId="Visio.Drawing.11">
                   <p:embed/>
                 </p:oleObj>
               </mc:Choice>
@@ -6105,7 +6105,7 @@
           <a:graphicData uri="http://schemas.openxmlformats.org/presentationml/2006/ole">
             <mc:AlternateContent xmlns:mc="http://schemas.openxmlformats.org/markup-compatibility/2006">
               <mc:Choice xmlns:v="urn:schemas-microsoft-com:vml" Requires="v">
-                <p:oleObj spid="_x0000_s3169" name="Visio" r:id="rId3" imgW="19291300" imgH="11760200" progId="Visio.Drawing.11">
+                <p:oleObj spid="_x0000_s3171" name="Visio" r:id="rId3" imgW="19291300" imgH="11760200" progId="Visio.Drawing.11">
                   <p:embed/>
                 </p:oleObj>
               </mc:Choice>
@@ -6815,7 +6815,7 @@
             <a:pPr lvl="1"/>
             <a:r>
               <a:rPr lang="en-US" sz="2600" dirty="0"/>
-              <a:t>From an information-theory perspective, the optimal channel capacity is achievable through power control (Smartness II) and interference cancellation,</a:t>
+              <a:t>From an information-theory perspective, the optimal channel capacity is achievable through power control (Smartness II) and interference cancellation</a:t>
             </a:r>
           </a:p>
           <a:p>

</xml_diff>